<commit_message>
Class Design.pptx 수정 양식 수정
</commit_message>
<xml_diff>
--- a/doc/3_ 설계서/Class Design.pptx
+++ b/doc/3_ 설계서/Class Design.pptx
@@ -1068,6 +1068,10 @@
             </a:lvl1pPr>
           </a:lstStyle>
           <a:p>
+            <a:r>
+              <a:rPr lang="en-US" altLang="ko-KR" dirty="0"/>
+              <a:t/>
+            </a:r>
             <a:br>
               <a:rPr lang="en-US" altLang="ko-KR" dirty="0"/>
             </a:br>
@@ -1129,28 +1133,28 @@
                 <a:gridCol w="1022523">
                   <a:extLst>
                     <a:ext uri="{9D8B030D-6E8A-4147-A177-3AD203B41FA5}">
-                      <a16:colId xmlns:a16="http://schemas.microsoft.com/office/drawing/2014/main" val="20000"/>
+                      <a16:colId xmlns:a16="http://schemas.microsoft.com/office/drawing/2014/main" xmlns="" val="20000"/>
                     </a:ext>
                   </a:extLst>
                 </a:gridCol>
                 <a:gridCol w="3439486">
                   <a:extLst>
                     <a:ext uri="{9D8B030D-6E8A-4147-A177-3AD203B41FA5}">
-                      <a16:colId xmlns:a16="http://schemas.microsoft.com/office/drawing/2014/main" val="20001"/>
+                      <a16:colId xmlns:a16="http://schemas.microsoft.com/office/drawing/2014/main" xmlns="" val="20001"/>
                     </a:ext>
                   </a:extLst>
                 </a:gridCol>
                 <a:gridCol w="947956">
                   <a:extLst>
                     <a:ext uri="{9D8B030D-6E8A-4147-A177-3AD203B41FA5}">
-                      <a16:colId xmlns:a16="http://schemas.microsoft.com/office/drawing/2014/main" val="20002"/>
+                      <a16:colId xmlns:a16="http://schemas.microsoft.com/office/drawing/2014/main" xmlns="" val="20002"/>
                     </a:ext>
                   </a:extLst>
                 </a:gridCol>
                 <a:gridCol w="3523377">
                   <a:extLst>
                     <a:ext uri="{9D8B030D-6E8A-4147-A177-3AD203B41FA5}">
-                      <a16:colId xmlns:a16="http://schemas.microsoft.com/office/drawing/2014/main" val="20003"/>
+                      <a16:colId xmlns:a16="http://schemas.microsoft.com/office/drawing/2014/main" xmlns="" val="20003"/>
                     </a:ext>
                   </a:extLst>
                 </a:gridCol>
@@ -1538,7 +1542,7 @@
                 </a:tc>
                 <a:extLst>
                   <a:ext uri="{0D108BD9-81ED-4DB2-BD59-A6C34878D82A}">
-                    <a16:rowId xmlns:a16="http://schemas.microsoft.com/office/drawing/2014/main" val="10000"/>
+                    <a16:rowId xmlns:a16="http://schemas.microsoft.com/office/drawing/2014/main" xmlns="" val="10000"/>
                   </a:ext>
                 </a:extLst>
               </a:tr>
@@ -1897,7 +1901,7 @@
                 </a:tc>
                 <a:extLst>
                   <a:ext uri="{0D108BD9-81ED-4DB2-BD59-A6C34878D82A}">
-                    <a16:rowId xmlns:a16="http://schemas.microsoft.com/office/drawing/2014/main" val="10001"/>
+                    <a16:rowId xmlns:a16="http://schemas.microsoft.com/office/drawing/2014/main" xmlns="" val="10001"/>
                   </a:ext>
                 </a:extLst>
               </a:tr>
@@ -3031,6 +3035,10 @@
           <a:bodyPr/>
           <a:lstStyle/>
           <a:p>
+            <a:r>
+              <a:rPr lang="en-US" altLang="ko-KR" dirty="0"/>
+              <a:t/>
+            </a:r>
             <a:br>
               <a:rPr lang="en-US" altLang="ko-KR" dirty="0"/>
             </a:br>
@@ -3054,7 +3062,7 @@
         <p:spPr>
           <a:xfrm>
             <a:off x="5617845" y="3526458"/>
-            <a:ext cx="3164649" cy="2769989"/>
+            <a:ext cx="2834430" cy="2708434"/>
           </a:xfrm>
           <a:prstGeom prst="rect">
             <a:avLst/>
@@ -3069,60 +3077,72 @@
           <a:p>
             <a:pPr latinLnBrk="1"/>
             <a:r>
-              <a:rPr lang="en-US" altLang="ko-KR" sz="2800" dirty="0"/>
+              <a:rPr lang="en-US" altLang="ko-KR" sz="2800" b="1" dirty="0"/>
               <a:t>&lt;1</a:t>
             </a:r>
             <a:r>
-              <a:rPr lang="ko-KR" altLang="ko-KR" sz="2800" dirty="0"/>
+              <a:rPr lang="ko-KR" altLang="ko-KR" sz="2800" b="1" dirty="0"/>
               <a:t>조</a:t>
             </a:r>
             <a:r>
-              <a:rPr lang="en-US" altLang="ko-KR" sz="2800" dirty="0"/>
-              <a:t> Big Bang&gt;</a:t>
+              <a:rPr lang="en-US" altLang="ko-KR" sz="2800" b="1" dirty="0"/>
+              <a:t> Big Bang</a:t>
             </a:r>
-            <a:endParaRPr lang="ko-KR" altLang="ko-KR" sz="2800" dirty="0"/>
+            <a:r>
+              <a:rPr lang="en-US" altLang="ko-KR" sz="2800" b="1" dirty="0" smtClean="0"/>
+              <a:t>&gt;</a:t>
+            </a:r>
+          </a:p>
+          <a:p>
+            <a:pPr latinLnBrk="1"/>
+            <a:endParaRPr lang="ko-KR" altLang="ko-KR" sz="700" b="1" dirty="0"/>
           </a:p>
           <a:p>
             <a:pPr latinLnBrk="1"/>
             <a:r>
-              <a:rPr lang="en-US" altLang="ko-KR" sz="2800" dirty="0"/>
+              <a:rPr lang="en-US" altLang="ko-KR" sz="2400" dirty="0"/>
               <a:t>201511026 </a:t>
             </a:r>
             <a:r>
-              <a:rPr lang="ko-KR" altLang="ko-KR" sz="2800" dirty="0"/>
+              <a:rPr lang="ko-KR" altLang="ko-KR" sz="2400" dirty="0"/>
               <a:t>서현아</a:t>
             </a:r>
           </a:p>
           <a:p>
             <a:pPr latinLnBrk="1"/>
             <a:r>
-              <a:rPr lang="en-US" altLang="ko-KR" sz="2800" dirty="0"/>
+              <a:rPr lang="en-US" altLang="ko-KR" sz="2400" dirty="0"/>
               <a:t>201111235 </a:t>
             </a:r>
             <a:r>
-              <a:rPr lang="ko-KR" altLang="ko-KR" sz="2800" dirty="0"/>
+              <a:rPr lang="en-US" altLang="ko-KR" sz="2400" dirty="0" smtClean="0"/>
+              <a:t> </a:t>
+            </a:r>
+            <a:r>
+              <a:rPr lang="ko-KR" altLang="ko-KR" sz="2400" dirty="0" smtClean="0"/>
               <a:t>신동규</a:t>
             </a:r>
+            <a:endParaRPr lang="ko-KR" altLang="ko-KR" sz="2400" dirty="0"/>
           </a:p>
           <a:p>
             <a:pPr latinLnBrk="1"/>
             <a:r>
-              <a:rPr lang="en-US" altLang="ko-KR" sz="2800" dirty="0"/>
+              <a:rPr lang="en-US" altLang="ko-KR" sz="2400" dirty="0"/>
               <a:t>201510998 </a:t>
             </a:r>
             <a:r>
-              <a:rPr lang="ko-KR" altLang="ko-KR" sz="2800" dirty="0"/>
+              <a:rPr lang="ko-KR" altLang="ko-KR" sz="2400" dirty="0"/>
               <a:t>김나연</a:t>
             </a:r>
           </a:p>
           <a:p>
             <a:pPr latinLnBrk="1"/>
             <a:r>
-              <a:rPr lang="en-US" altLang="ko-KR" sz="2800" dirty="0"/>
+              <a:rPr lang="en-US" altLang="ko-KR" sz="2400" dirty="0"/>
               <a:t>201410257 </a:t>
             </a:r>
             <a:r>
-              <a:rPr lang="ko-KR" altLang="ko-KR" sz="2800" dirty="0"/>
+              <a:rPr lang="ko-KR" altLang="ko-KR" sz="2400" dirty="0"/>
               <a:t>김동현</a:t>
             </a:r>
           </a:p>
@@ -3220,7 +3240,7 @@
             <p:ph idx="1"/>
             <p:extLst>
               <p:ext uri="{D42A27DB-BD31-4B8C-83A1-F6EECF244321}">
-                <p14:modId xmlns:p14="http://schemas.microsoft.com/office/powerpoint/2010/main" val="2343088688"/>
+                <p14:modId xmlns:p14="http://schemas.microsoft.com/office/powerpoint/2010/main" val="854949899"/>
               </p:ext>
             </p:extLst>
           </p:nvPr>
@@ -3239,28 +3259,28 @@
                 <a:gridCol w="2145506">
                   <a:extLst>
                     <a:ext uri="{9D8B030D-6E8A-4147-A177-3AD203B41FA5}">
-                      <a16:colId xmlns:a16="http://schemas.microsoft.com/office/drawing/2014/main" val="20000"/>
+                      <a16:colId xmlns:a16="http://schemas.microsoft.com/office/drawing/2014/main" xmlns="" val="20000"/>
                     </a:ext>
                   </a:extLst>
                 </a:gridCol>
                 <a:gridCol w="2145506">
                   <a:extLst>
                     <a:ext uri="{9D8B030D-6E8A-4147-A177-3AD203B41FA5}">
-                      <a16:colId xmlns:a16="http://schemas.microsoft.com/office/drawing/2014/main" val="20001"/>
+                      <a16:colId xmlns:a16="http://schemas.microsoft.com/office/drawing/2014/main" xmlns="" val="20001"/>
                     </a:ext>
                   </a:extLst>
                 </a:gridCol>
                 <a:gridCol w="2145506">
                   <a:extLst>
                     <a:ext uri="{9D8B030D-6E8A-4147-A177-3AD203B41FA5}">
-                      <a16:colId xmlns:a16="http://schemas.microsoft.com/office/drawing/2014/main" val="20002"/>
+                      <a16:colId xmlns:a16="http://schemas.microsoft.com/office/drawing/2014/main" xmlns="" val="20002"/>
                     </a:ext>
                   </a:extLst>
                 </a:gridCol>
                 <a:gridCol w="2145506">
                   <a:extLst>
                     <a:ext uri="{9D8B030D-6E8A-4147-A177-3AD203B41FA5}">
-                      <a16:colId xmlns:a16="http://schemas.microsoft.com/office/drawing/2014/main" val="20003"/>
+                      <a16:colId xmlns:a16="http://schemas.microsoft.com/office/drawing/2014/main" xmlns="" val="20003"/>
                     </a:ext>
                   </a:extLst>
                 </a:gridCol>
@@ -3388,7 +3408,7 @@
                 </a:tc>
                 <a:extLst>
                   <a:ext uri="{0D108BD9-81ED-4DB2-BD59-A6C34878D82A}">
-                    <a16:rowId xmlns:a16="http://schemas.microsoft.com/office/drawing/2014/main" val="10000"/>
+                    <a16:rowId xmlns:a16="http://schemas.microsoft.com/office/drawing/2014/main" xmlns="" val="10000"/>
                   </a:ext>
                 </a:extLst>
               </a:tr>
@@ -3563,7 +3583,7 @@
                 </a:tc>
                 <a:extLst>
                   <a:ext uri="{0D108BD9-81ED-4DB2-BD59-A6C34878D82A}">
-                    <a16:rowId xmlns:a16="http://schemas.microsoft.com/office/drawing/2014/main" val="10001"/>
+                    <a16:rowId xmlns:a16="http://schemas.microsoft.com/office/drawing/2014/main" xmlns="" val="10001"/>
                   </a:ext>
                 </a:extLst>
               </a:tr>
@@ -3722,7 +3742,7 @@
                 </a:tc>
                 <a:extLst>
                   <a:ext uri="{0D108BD9-81ED-4DB2-BD59-A6C34878D82A}">
-                    <a16:rowId xmlns:a16="http://schemas.microsoft.com/office/drawing/2014/main" val="10002"/>
+                    <a16:rowId xmlns:a16="http://schemas.microsoft.com/office/drawing/2014/main" xmlns="" val="10002"/>
                   </a:ext>
                 </a:extLst>
               </a:tr>
@@ -3733,6 +3753,16 @@
                     <a:lstStyle/>
                     <a:p>
                       <a:pPr algn="ctr" latinLnBrk="1"/>
+                      <a:r>
+                        <a:rPr lang="en-US" altLang="ko-KR" sz="1200" b="0" dirty="0" smtClean="0">
+                          <a:solidFill>
+                            <a:schemeClr val="tx1"/>
+                          </a:solidFill>
+                          <a:latin typeface="맑은 고딕" pitchFamily="50" charset="-127"/>
+                          <a:ea typeface="맑은 고딕" pitchFamily="50" charset="-127"/>
+                        </a:rPr>
+                        <a:t>2017 / 05 / 26</a:t>
+                      </a:r>
                       <a:endParaRPr lang="ko-KR" altLang="en-US" sz="1200" b="0" dirty="0">
                         <a:solidFill>
                           <a:schemeClr val="tx1"/>
@@ -3754,6 +3784,16 @@
                     <a:lstStyle/>
                     <a:p>
                       <a:pPr algn="ctr" latinLnBrk="1"/>
+                      <a:r>
+                        <a:rPr lang="en-US" altLang="ko-KR" sz="1200" b="0" dirty="0" smtClean="0">
+                          <a:solidFill>
+                            <a:schemeClr val="tx1"/>
+                          </a:solidFill>
+                          <a:latin typeface="맑은 고딕" pitchFamily="50" charset="-127"/>
+                          <a:ea typeface="맑은 고딕" pitchFamily="50" charset="-127"/>
+                        </a:rPr>
+                        <a:t>V1.2</a:t>
+                      </a:r>
                       <a:endParaRPr lang="ko-KR" altLang="en-US" sz="1200" b="0" dirty="0">
                         <a:solidFill>
                           <a:schemeClr val="tx1"/>
@@ -3775,7 +3815,7 @@
                     <a:lstStyle/>
                     <a:p>
                       <a:pPr latinLnBrk="1"/>
-                      <a:endParaRPr lang="ko-KR" altLang="en-US" sz="1200" b="0">
+                      <a:endParaRPr lang="ko-KR" altLang="en-US" sz="1200" b="0" dirty="0">
                         <a:solidFill>
                           <a:schemeClr val="tx1"/>
                         </a:solidFill>
@@ -3813,7 +3853,7 @@
                 </a:tc>
                 <a:extLst>
                   <a:ext uri="{0D108BD9-81ED-4DB2-BD59-A6C34878D82A}">
-                    <a16:rowId xmlns:a16="http://schemas.microsoft.com/office/drawing/2014/main" val="10003"/>
+                    <a16:rowId xmlns:a16="http://schemas.microsoft.com/office/drawing/2014/main" xmlns="" val="10003"/>
                   </a:ext>
                 </a:extLst>
               </a:tr>
@@ -3904,7 +3944,7 @@
                 </a:tc>
                 <a:extLst>
                   <a:ext uri="{0D108BD9-81ED-4DB2-BD59-A6C34878D82A}">
-                    <a16:rowId xmlns:a16="http://schemas.microsoft.com/office/drawing/2014/main" val="10004"/>
+                    <a16:rowId xmlns:a16="http://schemas.microsoft.com/office/drawing/2014/main" xmlns="" val="10004"/>
                   </a:ext>
                 </a:extLst>
               </a:tr>
@@ -3995,7 +4035,7 @@
                 </a:tc>
                 <a:extLst>
                   <a:ext uri="{0D108BD9-81ED-4DB2-BD59-A6C34878D82A}">
-                    <a16:rowId xmlns:a16="http://schemas.microsoft.com/office/drawing/2014/main" val="10005"/>
+                    <a16:rowId xmlns:a16="http://schemas.microsoft.com/office/drawing/2014/main" xmlns="" val="10005"/>
                   </a:ext>
                 </a:extLst>
               </a:tr>
@@ -4086,7 +4126,7 @@
                 </a:tc>
                 <a:extLst>
                   <a:ext uri="{0D108BD9-81ED-4DB2-BD59-A6C34878D82A}">
-                    <a16:rowId xmlns:a16="http://schemas.microsoft.com/office/drawing/2014/main" val="10006"/>
+                    <a16:rowId xmlns:a16="http://schemas.microsoft.com/office/drawing/2014/main" xmlns="" val="10006"/>
                   </a:ext>
                 </a:extLst>
               </a:tr>
@@ -4177,7 +4217,7 @@
                 </a:tc>
                 <a:extLst>
                   <a:ext uri="{0D108BD9-81ED-4DB2-BD59-A6C34878D82A}">
-                    <a16:rowId xmlns:a16="http://schemas.microsoft.com/office/drawing/2014/main" val="10007"/>
+                    <a16:rowId xmlns:a16="http://schemas.microsoft.com/office/drawing/2014/main" xmlns="" val="10007"/>
                   </a:ext>
                 </a:extLst>
               </a:tr>
@@ -4266,7 +4306,7 @@
         </p:nvSpPr>
         <p:spPr bwMode="auto">
           <a:xfrm>
-            <a:off x="7081520" y="449659"/>
+            <a:off x="7100770" y="449659"/>
             <a:ext cx="355600" cy="203200"/>
           </a:xfrm>
           <a:prstGeom prst="rect">
@@ -4367,7 +4407,7 @@
         <p:spPr>
           <a:xfrm>
             <a:off x="6908800" y="409377"/>
-            <a:ext cx="548640" cy="307777"/>
+            <a:ext cx="548640" cy="276999"/>
           </a:xfrm>
           <a:prstGeom prst="rect">
             <a:avLst/>
@@ -4381,10 +4421,16 @@
           <a:lstStyle/>
           <a:p>
             <a:r>
-              <a:rPr lang="en-US" altLang="ko-KR" dirty="0"/>
+              <a:rPr lang="en-US" altLang="ko-KR" sz="1200" dirty="0">
+                <a:latin typeface="HY중고딕" panose="02030600000101010101" pitchFamily="18" charset="-127"/>
+                <a:ea typeface="HY중고딕" panose="02030600000101010101" pitchFamily="18" charset="-127"/>
+              </a:rPr>
               <a:t>V1.1</a:t>
             </a:r>
-            <a:endParaRPr lang="ko-KR" altLang="en-US" dirty="0"/>
+            <a:endParaRPr lang="ko-KR" altLang="en-US" sz="1200" dirty="0">
+              <a:latin typeface="HY중고딕" panose="02030600000101010101" pitchFamily="18" charset="-127"/>
+              <a:ea typeface="HY중고딕" panose="02030600000101010101" pitchFamily="18" charset="-127"/>
+            </a:endParaRPr>
           </a:p>
         </p:txBody>
       </p:sp>

</xml_diff>

<commit_message>
#938 요구사항 변경 요청으로 인한 수정 1. Class Design.pptx 수정 2. UI Design Template.pptx 수정
</commit_message>
<xml_diff>
--- a/doc/3_ 설계서/Class Design.pptx
+++ b/doc/3_ 설계서/Class Design.pptx
@@ -857,6 +857,91 @@
     </a:lvl9pPr>
   </p:notesStyle>
 </p:notesMaster>
+</file>
+
+<file path=ppt/notesSlides/notesSlide1.xml><?xml version="1.0" encoding="utf-8"?>
+<p:notes xmlns:a="http://schemas.openxmlformats.org/drawingml/2006/main" xmlns:r="http://schemas.openxmlformats.org/officeDocument/2006/relationships" xmlns:p="http://schemas.openxmlformats.org/presentationml/2006/main">
+  <p:cSld>
+    <p:spTree>
+      <p:nvGrpSpPr>
+        <p:cNvPr id="1" name=""/>
+        <p:cNvGrpSpPr/>
+        <p:nvPr/>
+      </p:nvGrpSpPr>
+      <p:grpSpPr>
+        <a:xfrm>
+          <a:off x="0" y="0"/>
+          <a:ext cx="0" cy="0"/>
+          <a:chOff x="0" y="0"/>
+          <a:chExt cx="0" cy="0"/>
+        </a:xfrm>
+      </p:grpSpPr>
+      <p:sp>
+        <p:nvSpPr>
+          <p:cNvPr id="2" name="슬라이드 이미지 개체 틀 1"/>
+          <p:cNvSpPr>
+            <a:spLocks noGrp="1" noRot="1" noChangeAspect="1"/>
+          </p:cNvSpPr>
+          <p:nvPr>
+            <p:ph type="sldImg"/>
+          </p:nvPr>
+        </p:nvSpPr>
+        <p:spPr/>
+      </p:sp>
+      <p:sp>
+        <p:nvSpPr>
+          <p:cNvPr id="3" name="슬라이드 노트 개체 틀 2"/>
+          <p:cNvSpPr>
+            <a:spLocks noGrp="1"/>
+          </p:cNvSpPr>
+          <p:nvPr>
+            <p:ph type="body" idx="1"/>
+          </p:nvPr>
+        </p:nvSpPr>
+        <p:spPr/>
+        <p:txBody>
+          <a:bodyPr/>
+          <a:lstStyle/>
+          <a:p>
+            <a:endParaRPr lang="ko-KR" altLang="en-US" dirty="0"/>
+          </a:p>
+        </p:txBody>
+      </p:sp>
+      <p:sp>
+        <p:nvSpPr>
+          <p:cNvPr id="4" name="슬라이드 번호 개체 틀 3"/>
+          <p:cNvSpPr>
+            <a:spLocks noGrp="1"/>
+          </p:cNvSpPr>
+          <p:nvPr>
+            <p:ph type="sldNum" sz="quarter" idx="10"/>
+          </p:nvPr>
+        </p:nvSpPr>
+        <p:spPr/>
+        <p:txBody>
+          <a:bodyPr/>
+          <a:lstStyle/>
+          <a:p>
+            <a:fld id="{379E618C-E705-4CD1-A19E-88052652622A}" type="slidenum">
+              <a:rPr lang="en-US" smtClean="0"/>
+              <a:pPr/>
+              <a:t>5</a:t>
+            </a:fld>
+            <a:endParaRPr lang="en-US"/>
+          </a:p>
+        </p:txBody>
+      </p:sp>
+    </p:spTree>
+    <p:extLst>
+      <p:ext uri="{BB962C8B-B14F-4D97-AF65-F5344CB8AC3E}">
+        <p14:creationId xmlns:p14="http://schemas.microsoft.com/office/powerpoint/2010/main" val="2928172457"/>
+      </p:ext>
+    </p:extLst>
+  </p:cSld>
+  <p:clrMapOvr>
+    <a:masterClrMapping/>
+  </p:clrMapOvr>
+</p:notes>
 </file>
 
 <file path=ppt/slideLayouts/slideLayout1.xml><?xml version="1.0" encoding="utf-8"?>
@@ -3240,7 +3325,7 @@
             <p:ph idx="1"/>
             <p:extLst>
               <p:ext uri="{D42A27DB-BD31-4B8C-83A1-F6EECF244321}">
-                <p14:modId xmlns:p14="http://schemas.microsoft.com/office/powerpoint/2010/main" val="4008589978"/>
+                <p14:modId xmlns:p14="http://schemas.microsoft.com/office/powerpoint/2010/main" val="418085599"/>
               </p:ext>
             </p:extLst>
           </p:nvPr>
@@ -3263,14 +3348,14 @@
                     </a:ext>
                   </a:extLst>
                 </a:gridCol>
-                <a:gridCol w="2145506">
+                <a:gridCol w="1991502">
                   <a:extLst>
                     <a:ext uri="{9D8B030D-6E8A-4147-A177-3AD203B41FA5}">
                       <a16:colId xmlns="" xmlns:a16="http://schemas.microsoft.com/office/drawing/2014/main" val="20001"/>
                     </a:ext>
                   </a:extLst>
                 </a:gridCol>
-                <a:gridCol w="2145506">
+                <a:gridCol w="2299510">
                   <a:extLst>
                     <a:ext uri="{9D8B030D-6E8A-4147-A177-3AD203B41FA5}">
                       <a16:colId xmlns="" xmlns:a16="http://schemas.microsoft.com/office/drawing/2014/main" val="20002"/>
@@ -3436,14 +3521,14 @@
                         <a:defRPr/>
                       </a:pPr>
                       <a:r>
-                        <a:rPr lang="en-US" altLang="ko-KR" sz="1200" b="0" dirty="0">
+                        <a:rPr lang="en-US" altLang="ko-KR" sz="1200" b="0" dirty="0" smtClean="0">
                           <a:solidFill>
                             <a:schemeClr val="tx1"/>
                           </a:solidFill>
                           <a:latin typeface="맑은 고딕" pitchFamily="50" charset="-127"/>
                           <a:ea typeface="맑은 고딕" pitchFamily="50" charset="-127"/>
                         </a:rPr>
-                        <a:t>2017 / 05 / 26</a:t>
+                        <a:t>2017-05-26</a:t>
                       </a:r>
                       <a:endParaRPr lang="ko-KR" altLang="en-US" sz="1200" b="0" dirty="0">
                         <a:solidFill>
@@ -3595,14 +3680,14 @@
                     <a:p>
                       <a:pPr algn="ctr" latinLnBrk="1"/>
                       <a:r>
-                        <a:rPr lang="en-US" altLang="ko-KR" sz="1200" b="0" dirty="0">
+                        <a:rPr lang="en-US" altLang="ko-KR" sz="1200" b="0" dirty="0" smtClean="0">
                           <a:solidFill>
                             <a:schemeClr val="tx1"/>
                           </a:solidFill>
                           <a:latin typeface="맑은 고딕" pitchFamily="50" charset="-127"/>
                           <a:ea typeface="맑은 고딕" pitchFamily="50" charset="-127"/>
                         </a:rPr>
-                        <a:t>2017 / 05 / 26</a:t>
+                        <a:t>2017-05-26</a:t>
                       </a:r>
                       <a:endParaRPr lang="ko-KR" altLang="en-US" sz="1200" b="0" dirty="0">
                         <a:solidFill>
@@ -3761,7 +3846,7 @@
                           <a:latin typeface="맑은 고딕" pitchFamily="50" charset="-127"/>
                           <a:ea typeface="맑은 고딕" pitchFamily="50" charset="-127"/>
                         </a:rPr>
-                        <a:t>2017 / 05 / 26</a:t>
+                        <a:t>2017-05-26</a:t>
                       </a:r>
                       <a:endParaRPr lang="ko-KR" altLang="en-US" sz="1200" b="0" dirty="0">
                         <a:solidFill>
@@ -3814,16 +3899,16 @@
                     <a:bodyPr/>
                     <a:lstStyle/>
                     <a:p>
-                      <a:pPr latinLnBrk="1"/>
+                      <a:pPr algn="ctr" latinLnBrk="1"/>
                       <a:r>
-                        <a:rPr lang="en-US" altLang="ko-KR" sz="1200" b="0" dirty="0" smtClean="0">
+                        <a:rPr lang="ko-KR" altLang="en-US" sz="1200" b="0" dirty="0" smtClean="0">
                           <a:solidFill>
                             <a:schemeClr val="tx1"/>
                           </a:solidFill>
                           <a:latin typeface="맑은 고딕" pitchFamily="50" charset="-127"/>
                           <a:ea typeface="맑은 고딕" pitchFamily="50" charset="-127"/>
                         </a:rPr>
-                        <a:t>      </a:t>
+                        <a:t>양식 </a:t>
                       </a:r>
                       <a:r>
                         <a:rPr lang="ko-KR" altLang="en-US" sz="1200" b="0" dirty="0" smtClean="0">
@@ -3833,7 +3918,7 @@
                           <a:latin typeface="맑은 고딕" pitchFamily="50" charset="-127"/>
                           <a:ea typeface="맑은 고딕" pitchFamily="50" charset="-127"/>
                         </a:rPr>
-                        <a:t>양식 수정</a:t>
+                        <a:t>수정</a:t>
                       </a:r>
                       <a:endParaRPr lang="ko-KR" altLang="en-US" sz="1200" b="0" dirty="0">
                         <a:solidFill>
@@ -3894,48 +3979,16 @@
                     <a:lstStyle/>
                     <a:p>
                       <a:pPr algn="ctr" latinLnBrk="1"/>
-                      <a:endParaRPr lang="ko-KR" altLang="en-US" sz="1200" b="0">
-                        <a:solidFill>
-                          <a:schemeClr val="tx1"/>
-                        </a:solidFill>
-                        <a:latin typeface="맑은 고딕" pitchFamily="50" charset="-127"/>
-                        <a:ea typeface="맑은 고딕" pitchFamily="50" charset="-127"/>
-                      </a:endParaRPr>
-                    </a:p>
-                  </a:txBody>
-                  <a:tcPr anchor="ctr">
-                    <a:solidFill>
-                      <a:schemeClr val="bg1"/>
-                    </a:solidFill>
-                  </a:tcPr>
-                </a:tc>
-                <a:tc>
-                  <a:txBody>
-                    <a:bodyPr/>
-                    <a:lstStyle/>
-                    <a:p>
-                      <a:pPr algn="ctr" latinLnBrk="1"/>
-                      <a:endParaRPr lang="ko-KR" altLang="en-US" sz="1200" b="0" dirty="0">
-                        <a:solidFill>
-                          <a:schemeClr val="tx1"/>
-                        </a:solidFill>
-                        <a:latin typeface="맑은 고딕" pitchFamily="50" charset="-127"/>
-                        <a:ea typeface="맑은 고딕" pitchFamily="50" charset="-127"/>
-                      </a:endParaRPr>
-                    </a:p>
-                  </a:txBody>
-                  <a:tcPr anchor="ctr">
-                    <a:solidFill>
-                      <a:schemeClr val="bg1"/>
-                    </a:solidFill>
-                  </a:tcPr>
-                </a:tc>
-                <a:tc>
-                  <a:txBody>
-                    <a:bodyPr/>
-                    <a:lstStyle/>
-                    <a:p>
-                      <a:pPr latinLnBrk="1"/>
+                      <a:r>
+                        <a:rPr lang="en-US" altLang="ko-KR" sz="1200" b="0" dirty="0" smtClean="0">
+                          <a:solidFill>
+                            <a:schemeClr val="tx1"/>
+                          </a:solidFill>
+                          <a:latin typeface="맑은 고딕" pitchFamily="50" charset="-127"/>
+                          <a:ea typeface="맑은 고딕" pitchFamily="50" charset="-127"/>
+                        </a:rPr>
+                        <a:t>2017-06-05</a:t>
+                      </a:r>
                       <a:endParaRPr lang="ko-KR" altLang="en-US" sz="1200" b="0" dirty="0">
                         <a:solidFill>
                           <a:schemeClr val="tx1"/>
@@ -3957,6 +4010,88 @@
                     <a:lstStyle/>
                     <a:p>
                       <a:pPr algn="ctr" latinLnBrk="1"/>
+                      <a:r>
+                        <a:rPr lang="en-US" altLang="ko-KR" sz="1200" b="0" dirty="0" smtClean="0">
+                          <a:solidFill>
+                            <a:schemeClr val="tx1"/>
+                          </a:solidFill>
+                          <a:latin typeface="맑은 고딕" pitchFamily="50" charset="-127"/>
+                          <a:ea typeface="맑은 고딕" pitchFamily="50" charset="-127"/>
+                        </a:rPr>
+                        <a:t>V2.0</a:t>
+                      </a:r>
+                      <a:endParaRPr lang="ko-KR" altLang="en-US" sz="1200" b="0" dirty="0">
+                        <a:solidFill>
+                          <a:schemeClr val="tx1"/>
+                        </a:solidFill>
+                        <a:latin typeface="맑은 고딕" pitchFamily="50" charset="-127"/>
+                        <a:ea typeface="맑은 고딕" pitchFamily="50" charset="-127"/>
+                      </a:endParaRPr>
+                    </a:p>
+                  </a:txBody>
+                  <a:tcPr anchor="ctr">
+                    <a:solidFill>
+                      <a:schemeClr val="bg1"/>
+                    </a:solidFill>
+                  </a:tcPr>
+                </a:tc>
+                <a:tc>
+                  <a:txBody>
+                    <a:bodyPr/>
+                    <a:lstStyle/>
+                    <a:p>
+                      <a:pPr algn="ctr" latinLnBrk="1"/>
+                      <a:r>
+                        <a:rPr lang="ko-KR" altLang="en-US" sz="1200" b="0" dirty="0" smtClean="0">
+                          <a:solidFill>
+                            <a:schemeClr val="tx1"/>
+                          </a:solidFill>
+                          <a:latin typeface="맑은 고딕" pitchFamily="50" charset="-127"/>
+                          <a:ea typeface="맑은 고딕" pitchFamily="50" charset="-127"/>
+                        </a:rPr>
+                        <a:t>변경된 요구사항에 대한 수정</a:t>
+                      </a:r>
+                      <a:endParaRPr lang="ko-KR" altLang="en-US" sz="1200" b="0" dirty="0">
+                        <a:solidFill>
+                          <a:schemeClr val="tx1"/>
+                        </a:solidFill>
+                        <a:latin typeface="맑은 고딕" pitchFamily="50" charset="-127"/>
+                        <a:ea typeface="맑은 고딕" pitchFamily="50" charset="-127"/>
+                      </a:endParaRPr>
+                    </a:p>
+                  </a:txBody>
+                  <a:tcPr anchor="ctr">
+                    <a:solidFill>
+                      <a:schemeClr val="bg1"/>
+                    </a:solidFill>
+                  </a:tcPr>
+                </a:tc>
+                <a:tc>
+                  <a:txBody>
+                    <a:bodyPr/>
+                    <a:lstStyle/>
+                    <a:p>
+                      <a:pPr algn="ctr" latinLnBrk="1"/>
+                      <a:r>
+                        <a:rPr lang="ko-KR" altLang="en-US" sz="1200" b="0" dirty="0" smtClean="0">
+                          <a:solidFill>
+                            <a:schemeClr val="tx1"/>
+                          </a:solidFill>
+                          <a:latin typeface="맑은 고딕" pitchFamily="50" charset="-127"/>
+                          <a:ea typeface="맑은 고딕" pitchFamily="50" charset="-127"/>
+                        </a:rPr>
+                        <a:t>서현</a:t>
+                      </a:r>
+                      <a:r>
+                        <a:rPr lang="ko-KR" altLang="en-US" sz="1200" b="0" dirty="0" smtClean="0">
+                          <a:solidFill>
+                            <a:schemeClr val="tx1"/>
+                          </a:solidFill>
+                          <a:latin typeface="맑은 고딕" pitchFamily="50" charset="-127"/>
+                          <a:ea typeface="맑은 고딕" pitchFamily="50" charset="-127"/>
+                        </a:rPr>
+                        <a:t>아</a:t>
+                      </a:r>
                       <a:endParaRPr lang="ko-KR" altLang="en-US" sz="1200" b="0" dirty="0">
                         <a:solidFill>
                           <a:schemeClr val="tx1"/>
@@ -4451,11 +4586,11 @@
           <a:lstStyle/>
           <a:p>
             <a:r>
-              <a:rPr lang="en-US" altLang="ko-KR" sz="1200" dirty="0">
+              <a:rPr lang="en-US" altLang="ko-KR" sz="1200" dirty="0" smtClean="0">
                 <a:latin typeface="HY중고딕" panose="02030600000101010101" pitchFamily="18" charset="-127"/>
                 <a:ea typeface="HY중고딕" panose="02030600000101010101" pitchFamily="18" charset="-127"/>
               </a:rPr>
-              <a:t>V1.1</a:t>
+              <a:t>V2.0</a:t>
             </a:r>
             <a:endParaRPr lang="ko-KR" altLang="en-US" sz="1200" dirty="0">
               <a:latin typeface="HY중고딕" panose="02030600000101010101" pitchFamily="18" charset="-127"/>
@@ -4687,7 +4822,7 @@
         <p:spPr>
           <a:xfrm>
             <a:off x="6908800" y="409377"/>
-            <a:ext cx="548640" cy="307777"/>
+            <a:ext cx="637406" cy="523220"/>
           </a:xfrm>
           <a:prstGeom prst="rect">
             <a:avLst/>
@@ -4701,9 +4836,18 @@
           <a:lstStyle/>
           <a:p>
             <a:r>
-              <a:rPr lang="en-US" altLang="ko-KR" dirty="0"/>
-              <a:t>V1.1</a:t>
+              <a:rPr lang="en-US" altLang="ko-KR" dirty="0">
+                <a:latin typeface="HY중고딕" panose="02030600000101010101" pitchFamily="18" charset="-127"/>
+                <a:ea typeface="HY중고딕" panose="02030600000101010101" pitchFamily="18" charset="-127"/>
+              </a:rPr>
+              <a:t>V2.0</a:t>
             </a:r>
+            <a:endParaRPr lang="ko-KR" altLang="en-US" dirty="0">
+              <a:latin typeface="HY중고딕" panose="02030600000101010101" pitchFamily="18" charset="-127"/>
+              <a:ea typeface="HY중고딕" panose="02030600000101010101" pitchFamily="18" charset="-127"/>
+            </a:endParaRPr>
+          </a:p>
+          <a:p>
             <a:endParaRPr lang="ko-KR" altLang="en-US" dirty="0"/>
           </a:p>
         </p:txBody>
@@ -4894,8 +5038,8 @@
         </p:nvSpPr>
         <p:spPr>
           <a:xfrm>
-            <a:off x="6908800" y="419537"/>
-            <a:ext cx="548640" cy="307777"/>
+            <a:off x="6908799" y="419537"/>
+            <a:ext cx="733659" cy="523220"/>
           </a:xfrm>
           <a:prstGeom prst="rect">
             <a:avLst/>
@@ -4909,9 +5053,18 @@
           <a:lstStyle/>
           <a:p>
             <a:r>
-              <a:rPr lang="en-US" altLang="ko-KR" dirty="0"/>
-              <a:t>V1.1</a:t>
+              <a:rPr lang="en-US" altLang="ko-KR" dirty="0">
+                <a:latin typeface="HY중고딕" panose="02030600000101010101" pitchFamily="18" charset="-127"/>
+                <a:ea typeface="HY중고딕" panose="02030600000101010101" pitchFamily="18" charset="-127"/>
+              </a:rPr>
+              <a:t>V2.0</a:t>
             </a:r>
+            <a:endParaRPr lang="ko-KR" altLang="en-US" dirty="0">
+              <a:latin typeface="HY중고딕" panose="02030600000101010101" pitchFamily="18" charset="-127"/>
+              <a:ea typeface="HY중고딕" panose="02030600000101010101" pitchFamily="18" charset="-127"/>
+            </a:endParaRPr>
+          </a:p>
+          <a:p>
             <a:endParaRPr lang="ko-KR" altLang="en-US" dirty="0"/>
           </a:p>
         </p:txBody>
@@ -4925,7 +5078,7 @@
           <p:nvPr/>
         </p:nvPicPr>
         <p:blipFill>
-          <a:blip r:embed="rId2"/>
+          <a:blip r:embed="rId3"/>
           <a:stretch>
             <a:fillRect/>
           </a:stretch>
@@ -4934,6 +5087,30 @@
           <a:xfrm>
             <a:off x="152400" y="1029970"/>
             <a:ext cx="8879840" cy="4994910"/>
+          </a:xfrm>
+          <a:prstGeom prst="rect">
+            <a:avLst/>
+          </a:prstGeom>
+        </p:spPr>
+      </p:pic>
+      <p:pic>
+        <p:nvPicPr>
+          <p:cNvPr id="3" name="그림 2"/>
+          <p:cNvPicPr>
+            <a:picLocks noChangeAspect="1"/>
+          </p:cNvPicPr>
+          <p:nvPr/>
+        </p:nvPicPr>
+        <p:blipFill>
+          <a:blip r:embed="rId4"/>
+          <a:stretch>
+            <a:fillRect/>
+          </a:stretch>
+        </p:blipFill>
+        <p:spPr>
+          <a:xfrm>
+            <a:off x="1435631" y="1388534"/>
+            <a:ext cx="1417636" cy="4047066"/>
           </a:xfrm>
           <a:prstGeom prst="rect">
             <a:avLst/>

</xml_diff>